<commit_message>
Pre-Vegas updates- reorganization and climb ratings
</commit_message>
<xml_diff>
--- a/alliances/alliance_interface.pptx
+++ b/alliances/alliance_interface.pptx
@@ -247,7 +247,7 @@
           <a:p>
             <a:fld id="{B0EC7D9C-C39F-4904-9B8C-0ED70A370381}" type="datetimeFigureOut">
               <a:rPr lang="en-US" smtClean="0"/>
-              <a:t>3/13/2017</a:t>
+              <a:t>3/28/2017</a:t>
             </a:fld>
             <a:endParaRPr lang="en-US"/>
           </a:p>
@@ -415,7 +415,7 @@
           <a:p>
             <a:fld id="{B0EC7D9C-C39F-4904-9B8C-0ED70A370381}" type="datetimeFigureOut">
               <a:rPr lang="en-US" smtClean="0"/>
-              <a:t>3/13/2017</a:t>
+              <a:t>3/28/2017</a:t>
             </a:fld>
             <a:endParaRPr lang="en-US"/>
           </a:p>
@@ -593,7 +593,7 @@
           <a:p>
             <a:fld id="{B0EC7D9C-C39F-4904-9B8C-0ED70A370381}" type="datetimeFigureOut">
               <a:rPr lang="en-US" smtClean="0"/>
-              <a:t>3/13/2017</a:t>
+              <a:t>3/28/2017</a:t>
             </a:fld>
             <a:endParaRPr lang="en-US"/>
           </a:p>
@@ -761,7 +761,7 @@
           <a:p>
             <a:fld id="{B0EC7D9C-C39F-4904-9B8C-0ED70A370381}" type="datetimeFigureOut">
               <a:rPr lang="en-US" smtClean="0"/>
-              <a:t>3/13/2017</a:t>
+              <a:t>3/28/2017</a:t>
             </a:fld>
             <a:endParaRPr lang="en-US"/>
           </a:p>
@@ -1006,7 +1006,7 @@
           <a:p>
             <a:fld id="{B0EC7D9C-C39F-4904-9B8C-0ED70A370381}" type="datetimeFigureOut">
               <a:rPr lang="en-US" smtClean="0"/>
-              <a:t>3/13/2017</a:t>
+              <a:t>3/28/2017</a:t>
             </a:fld>
             <a:endParaRPr lang="en-US"/>
           </a:p>
@@ -1235,7 +1235,7 @@
           <a:p>
             <a:fld id="{B0EC7D9C-C39F-4904-9B8C-0ED70A370381}" type="datetimeFigureOut">
               <a:rPr lang="en-US" smtClean="0"/>
-              <a:t>3/13/2017</a:t>
+              <a:t>3/28/2017</a:t>
             </a:fld>
             <a:endParaRPr lang="en-US"/>
           </a:p>
@@ -1599,7 +1599,7 @@
           <a:p>
             <a:fld id="{B0EC7D9C-C39F-4904-9B8C-0ED70A370381}" type="datetimeFigureOut">
               <a:rPr lang="en-US" smtClean="0"/>
-              <a:t>3/13/2017</a:t>
+              <a:t>3/28/2017</a:t>
             </a:fld>
             <a:endParaRPr lang="en-US"/>
           </a:p>
@@ -1716,7 +1716,7 @@
           <a:p>
             <a:fld id="{B0EC7D9C-C39F-4904-9B8C-0ED70A370381}" type="datetimeFigureOut">
               <a:rPr lang="en-US" smtClean="0"/>
-              <a:t>3/13/2017</a:t>
+              <a:t>3/28/2017</a:t>
             </a:fld>
             <a:endParaRPr lang="en-US"/>
           </a:p>
@@ -1811,7 +1811,7 @@
           <a:p>
             <a:fld id="{B0EC7D9C-C39F-4904-9B8C-0ED70A370381}" type="datetimeFigureOut">
               <a:rPr lang="en-US" smtClean="0"/>
-              <a:t>3/13/2017</a:t>
+              <a:t>3/28/2017</a:t>
             </a:fld>
             <a:endParaRPr lang="en-US"/>
           </a:p>
@@ -2086,7 +2086,7 @@
           <a:p>
             <a:fld id="{B0EC7D9C-C39F-4904-9B8C-0ED70A370381}" type="datetimeFigureOut">
               <a:rPr lang="en-US" smtClean="0"/>
-              <a:t>3/13/2017</a:t>
+              <a:t>3/28/2017</a:t>
             </a:fld>
             <a:endParaRPr lang="en-US"/>
           </a:p>
@@ -2338,7 +2338,7 @@
           <a:p>
             <a:fld id="{B0EC7D9C-C39F-4904-9B8C-0ED70A370381}" type="datetimeFigureOut">
               <a:rPr lang="en-US" smtClean="0"/>
-              <a:t>3/13/2017</a:t>
+              <a:t>3/28/2017</a:t>
             </a:fld>
             <a:endParaRPr lang="en-US"/>
           </a:p>
@@ -2549,7 +2549,7 @@
           <a:p>
             <a:fld id="{B0EC7D9C-C39F-4904-9B8C-0ED70A370381}" type="datetimeFigureOut">
               <a:rPr lang="en-US" smtClean="0"/>
-              <a:t>3/13/2017</a:t>
+              <a:t>3/28/2017</a:t>
             </a:fld>
             <a:endParaRPr lang="en-US"/>
           </a:p>
@@ -6791,17 +6791,7 @@
                         <a:schemeClr val="tx1"/>
                       </a:solidFill>
                     </a:rPr>
-                    <a:t>Floor Ball intake: avg_auto_floor_ball_intake_1</a:t>
-                  </a:r>
-                </a:p>
-                <a:p>
-                  <a:r>
-                    <a:rPr lang="en-US" sz="1200" b="1" dirty="0">
-                      <a:solidFill>
-                        <a:schemeClr val="tx1"/>
-                      </a:solidFill>
-                    </a:rPr>
-                    <a:t>Gears Scored LMR: tot_auto_gears_scored_top_1/tot_auto_gears_scored_mid_1/tot_auto_gears_scored_bot_1</a:t>
+                    <a:t>Gears Scored LMR: tot_auto_gears_scored_left_1/tot_auto_gears_scored_mid_1/tot_auto_gears_scored_right_1</a:t>
                   </a:r>
                 </a:p>
                 <a:p>
@@ -7267,21 +7257,6 @@
                         <a:schemeClr val="tx1"/>
                       </a:solidFill>
                     </a:rPr>
-                    <a:t>HP Ball Intake: avg_hp_ball_intake_1</a:t>
-                  </a:r>
-                </a:p>
-                <a:p>
-                  <a:pPr>
-                    <a:spcBef>
-                      <a:spcPts val="10"/>
-                    </a:spcBef>
-                  </a:pPr>
-                  <a:r>
-                    <a:rPr lang="en-US" sz="1200" b="1" dirty="0">
-                      <a:solidFill>
-                        <a:schemeClr val="tx1"/>
-                      </a:solidFill>
-                    </a:rPr>
                     <a:t>Floor Gear Intake: avg_tele_floor_gear_intake_1</a:t>
                   </a:r>
                 </a:p>
@@ -7355,21 +7330,6 @@
                       </a:solidFill>
                     </a:rPr>
                     <a:t>Mobility: avg_mobility_rating_1</a:t>
-                  </a:r>
-                </a:p>
-                <a:p>
-                  <a:pPr>
-                    <a:spcBef>
-                      <a:spcPts val="10"/>
-                    </a:spcBef>
-                  </a:pPr>
-                  <a:r>
-                    <a:rPr lang="en-US" sz="1200" b="1" dirty="0">
-                      <a:solidFill>
-                        <a:schemeClr val="tx1"/>
-                      </a:solidFill>
-                    </a:rPr>
-                    <a:t>Fouls: tot_fouls_1</a:t>
                   </a:r>
                 </a:p>
               </p:txBody>
@@ -7650,17 +7610,7 @@
                         <a:schemeClr val="tx1"/>
                       </a:solidFill>
                     </a:rPr>
-                    <a:t>Floor Ball intake: avg_auto_floor_ball_intake_2</a:t>
-                  </a:r>
-                </a:p>
-                <a:p>
-                  <a:r>
-                    <a:rPr lang="en-US" sz="1200" b="1" dirty="0">
-                      <a:solidFill>
-                        <a:schemeClr val="tx1"/>
-                      </a:solidFill>
-                    </a:rPr>
-                    <a:t>Gears Scored LMR: tot_auto_gears_scored_top_2/tot_auto_gears_scored_mid_2/tot_auto_gears_scored_bot_2</a:t>
+                    <a:t>Gears Scored LMR: tot_auto_gears_scored_left_2/tot_auto_gears_scored_mid_2/tot_auto_gears_scored_right_2</a:t>
                   </a:r>
                 </a:p>
                 <a:p>
@@ -7672,6 +7622,13 @@
                     </a:rPr>
                     <a:t>Gears Scored Tot: tot_auto_gears_scored_2/tot_auto_gears_attempts_2/max_auto_gears_scored_2</a:t>
                   </a:r>
+                </a:p>
+                <a:p>
+                  <a:endParaRPr lang="en-US" sz="1200" b="1" dirty="0">
+                    <a:solidFill>
+                      <a:schemeClr val="tx1"/>
+                    </a:solidFill>
+                  </a:endParaRPr>
                 </a:p>
               </p:txBody>
             </p:sp>
@@ -7796,16 +7753,6 @@
                         <a:schemeClr val="tx1"/>
                       </a:solidFill>
                     </a:rPr>
-                    <a:t>HP Ball Intake: avg_hp_ball_intake_2</a:t>
-                  </a:r>
-                </a:p>
-                <a:p>
-                  <a:r>
-                    <a:rPr lang="en-US" sz="1200" b="1" dirty="0">
-                      <a:solidFill>
-                        <a:schemeClr val="tx1"/>
-                      </a:solidFill>
-                    </a:rPr>
                     <a:t>Floor Gear Intake: avg_tele_floor_gear_intake_2</a:t>
                   </a:r>
                 </a:p>
@@ -7854,16 +7801,6 @@
                       </a:solidFill>
                     </a:rPr>
                     <a:t>Mobility: avg_mobility_rating_2</a:t>
-                  </a:r>
-                </a:p>
-                <a:p>
-                  <a:r>
-                    <a:rPr lang="en-US" sz="1200" b="1" dirty="0">
-                      <a:solidFill>
-                        <a:schemeClr val="tx1"/>
-                      </a:solidFill>
-                    </a:rPr>
-                    <a:t>Fouls: tot_fouls_2</a:t>
                   </a:r>
                 </a:p>
               </p:txBody>
@@ -7962,17 +7899,7 @@
                         <a:schemeClr val="tx1"/>
                       </a:solidFill>
                     </a:rPr>
-                    <a:t>Floor Ball intake: avg_auto_floor_ball_intake_3</a:t>
-                  </a:r>
-                </a:p>
-                <a:p>
-                  <a:r>
-                    <a:rPr lang="en-US" sz="1200" b="1" dirty="0">
-                      <a:solidFill>
-                        <a:schemeClr val="tx1"/>
-                      </a:solidFill>
-                    </a:rPr>
-                    <a:t>Gears Scored LMR: tot_auto_gears_scored_top_3/tot_auto_gears_scored_mid_3/tot_auto_gears_scored_bot_3</a:t>
+                    <a:t>Gears Scored LMR: tot_auto_gears_scored_left_3/tot_auto_gears_scored_mid_3/tot_auto_gears_scored_right_3</a:t>
                   </a:r>
                 </a:p>
                 <a:p>
@@ -7984,6 +7911,13 @@
                     </a:rPr>
                     <a:t>Gears Scored Tot: tot_auto_gears_scored_3/tot_auto_gears_attempts_3/max_auto_gears_scored_3</a:t>
                   </a:r>
+                </a:p>
+                <a:p>
+                  <a:endParaRPr lang="en-US" sz="1200" b="1" dirty="0">
+                    <a:solidFill>
+                      <a:schemeClr val="tx1"/>
+                    </a:solidFill>
+                  </a:endParaRPr>
                 </a:p>
               </p:txBody>
             </p:sp>
@@ -8108,16 +8042,6 @@
                         <a:schemeClr val="tx1"/>
                       </a:solidFill>
                     </a:rPr>
-                    <a:t>HP Ball Intake: avg_hp_ball_intake_3</a:t>
-                  </a:r>
-                </a:p>
-                <a:p>
-                  <a:r>
-                    <a:rPr lang="en-US" sz="1200" b="1" dirty="0">
-                      <a:solidFill>
-                        <a:schemeClr val="tx1"/>
-                      </a:solidFill>
-                    </a:rPr>
                     <a:t>Floor Gear Intake: avg_tele_floor_gear_intake_3</a:t>
                   </a:r>
                 </a:p>
@@ -8166,16 +8090,6 @@
                       </a:solidFill>
                     </a:rPr>
                     <a:t>Mobility: avg_mobility_rating_3</a:t>
-                  </a:r>
-                </a:p>
-                <a:p>
-                  <a:r>
-                    <a:rPr lang="en-US" sz="1200" b="1" dirty="0">
-                      <a:solidFill>
-                        <a:schemeClr val="tx1"/>
-                      </a:solidFill>
-                    </a:rPr>
-                    <a:t>Fouls: tot_fouls_3</a:t>
                   </a:r>
                 </a:p>
               </p:txBody>
@@ -8274,17 +8188,7 @@
                         <a:schemeClr val="tx1"/>
                       </a:solidFill>
                     </a:rPr>
-                    <a:t>Floor Ball intake: avg_auto_floor_ball_intake_4</a:t>
-                  </a:r>
-                </a:p>
-                <a:p>
-                  <a:r>
-                    <a:rPr lang="en-US" sz="1200" b="1" dirty="0">
-                      <a:solidFill>
-                        <a:schemeClr val="tx1"/>
-                      </a:solidFill>
-                    </a:rPr>
-                    <a:t>Gears Scored LMR: tot_auto_gears_scored_top_4/tot_auto_gears_scored_mid_4/tot_auto_gears_scored_bot_4</a:t>
+                    <a:t>Gears Scored LMR: tot_auto_gears_scored_left_4/tot_auto_gears_scored_mid_4/tot_auto_gears_scored_right_4</a:t>
                   </a:r>
                 </a:p>
                 <a:p>
@@ -8296,6 +8200,13 @@
                     </a:rPr>
                     <a:t>Gears Scored Tot: tot_auto_gears_scored_4/tot_auto_gears_attempts_4/max_auto_gears_scored_4</a:t>
                   </a:r>
+                </a:p>
+                <a:p>
+                  <a:endParaRPr lang="en-US" sz="1200" b="1" dirty="0">
+                    <a:solidFill>
+                      <a:schemeClr val="tx1"/>
+                    </a:solidFill>
+                  </a:endParaRPr>
                 </a:p>
               </p:txBody>
             </p:sp>
@@ -8748,21 +8659,6 @@
                         <a:schemeClr val="tx1"/>
                       </a:solidFill>
                     </a:rPr>
-                    <a:t>HP Ball Intake: avg_hp_ball_intake_4</a:t>
-                  </a:r>
-                </a:p>
-                <a:p>
-                  <a:pPr>
-                    <a:spcBef>
-                      <a:spcPts val="10"/>
-                    </a:spcBef>
-                  </a:pPr>
-                  <a:r>
-                    <a:rPr lang="en-US" sz="1200" b="1" dirty="0">
-                      <a:solidFill>
-                        <a:schemeClr val="tx1"/>
-                      </a:solidFill>
-                    </a:rPr>
                     <a:t>Floor Gear Intake: avg_tele_floor_gear_intake_4</a:t>
                   </a:r>
                 </a:p>
@@ -8836,21 +8732,6 @@
                       </a:solidFill>
                     </a:rPr>
                     <a:t>Mobility: avg_mobility_rating_4</a:t>
-                  </a:r>
-                </a:p>
-                <a:p>
-                  <a:pPr>
-                    <a:spcBef>
-                      <a:spcPts val="10"/>
-                    </a:spcBef>
-                  </a:pPr>
-                  <a:r>
-                    <a:rPr lang="en-US" sz="1200" b="1" dirty="0">
-                      <a:solidFill>
-                        <a:schemeClr val="tx1"/>
-                      </a:solidFill>
-                    </a:rPr>
-                    <a:t>Fouls: tot_fouls_4</a:t>
                   </a:r>
                 </a:p>
               </p:txBody>
@@ -9131,17 +9012,7 @@
                         <a:schemeClr val="tx1"/>
                       </a:solidFill>
                     </a:rPr>
-                    <a:t>Floor Ball intake: avg_auto_floor_ball_intake_5</a:t>
-                  </a:r>
-                </a:p>
-                <a:p>
-                  <a:r>
-                    <a:rPr lang="en-US" sz="1200" b="1" dirty="0">
-                      <a:solidFill>
-                        <a:schemeClr val="tx1"/>
-                      </a:solidFill>
-                    </a:rPr>
-                    <a:t>Gears Scored LMR: tot_auto_gears_scored_top_5/tot_auto_gears_scored_mid_5/tot_auto_gears_scored_bot_5</a:t>
+                    <a:t>Gears Scored LMR: tot_auto_gears_scored_left_5/tot_auto_gears_scored_mid_5/tot_auto_gears_scored_right_5</a:t>
                   </a:r>
                 </a:p>
                 <a:p>
@@ -9153,6 +9024,13 @@
                     </a:rPr>
                     <a:t>Gears Scored Tot: tot_auto_gears_scored_5/tot_auto_gears_attempts_5/max_auto_gears_scored_5</a:t>
                   </a:r>
+                </a:p>
+                <a:p>
+                  <a:endParaRPr lang="en-US" sz="1200" b="1" dirty="0">
+                    <a:solidFill>
+                      <a:schemeClr val="tx1"/>
+                    </a:solidFill>
+                  </a:endParaRPr>
                 </a:p>
               </p:txBody>
             </p:sp>
@@ -9277,16 +9155,6 @@
                         <a:schemeClr val="tx1"/>
                       </a:solidFill>
                     </a:rPr>
-                    <a:t>HP Ball Intake: avg_hp_ball_intake_5</a:t>
-                  </a:r>
-                </a:p>
-                <a:p>
-                  <a:r>
-                    <a:rPr lang="en-US" sz="1200" b="1" dirty="0">
-                      <a:solidFill>
-                        <a:schemeClr val="tx1"/>
-                      </a:solidFill>
-                    </a:rPr>
                     <a:t>Floor Gear Intake: avg_tele_floor_gear_intake_5</a:t>
                   </a:r>
                 </a:p>
@@ -9335,16 +9203,6 @@
                       </a:solidFill>
                     </a:rPr>
                     <a:t>Mobility: avg_mobility_rating_5</a:t>
-                  </a:r>
-                </a:p>
-                <a:p>
-                  <a:r>
-                    <a:rPr lang="en-US" sz="1200" b="1" dirty="0">
-                      <a:solidFill>
-                        <a:schemeClr val="tx1"/>
-                      </a:solidFill>
-                    </a:rPr>
-                    <a:t>Fouls: tot_fouls_5</a:t>
                   </a:r>
                 </a:p>
               </p:txBody>
@@ -9443,17 +9301,7 @@
                         <a:schemeClr val="tx1"/>
                       </a:solidFill>
                     </a:rPr>
-                    <a:t>Floor Ball intake: avg_auto_floor_ball_intake_6</a:t>
-                  </a:r>
-                </a:p>
-                <a:p>
-                  <a:r>
-                    <a:rPr lang="en-US" sz="1200" b="1" dirty="0">
-                      <a:solidFill>
-                        <a:schemeClr val="tx1"/>
-                      </a:solidFill>
-                    </a:rPr>
-                    <a:t>Gears Scored LMR: tot_auto_gears_scored_top_6/tot_auto_gears_scored_mid_6/tot_auto_gears_scored_bot_6</a:t>
+                    <a:t>Gears Scored LMR: tot_auto_gears_scored_left_6/tot_auto_gears_scored_mid_6/tot_auto_gears_scored_right_6</a:t>
                   </a:r>
                 </a:p>
                 <a:p>
@@ -9465,6 +9313,13 @@
                     </a:rPr>
                     <a:t>Gears Scored Tot: tot_auto_gears_scored_6/tot_auto_gears_attempts_6/max_auto_gears_scored_6</a:t>
                   </a:r>
+                </a:p>
+                <a:p>
+                  <a:endParaRPr lang="en-US" sz="1200" b="1" dirty="0">
+                    <a:solidFill>
+                      <a:schemeClr val="tx1"/>
+                    </a:solidFill>
+                  </a:endParaRPr>
                 </a:p>
               </p:txBody>
             </p:sp>
@@ -9589,16 +9444,6 @@
                         <a:schemeClr val="tx1"/>
                       </a:solidFill>
                     </a:rPr>
-                    <a:t>HP Ball Intake: avg_hp_ball_intake_6</a:t>
-                  </a:r>
-                </a:p>
-                <a:p>
-                  <a:r>
-                    <a:rPr lang="en-US" sz="1200" b="1" dirty="0">
-                      <a:solidFill>
-                        <a:schemeClr val="tx1"/>
-                      </a:solidFill>
-                    </a:rPr>
                     <a:t>Floor Gear Intake: avg_tele_floor_gear_intake_6</a:t>
                   </a:r>
                 </a:p>
@@ -9647,16 +9492,6 @@
                       </a:solidFill>
                     </a:rPr>
                     <a:t>Mobility: avg_mobility_rating_6</a:t>
-                  </a:r>
-                </a:p>
-                <a:p>
-                  <a:r>
-                    <a:rPr lang="en-US" sz="1200" b="1" dirty="0">
-                      <a:solidFill>
-                        <a:schemeClr val="tx1"/>
-                      </a:solidFill>
-                    </a:rPr>
-                    <a:t>Fouls: tot_fouls_6</a:t>
                   </a:r>
                 </a:p>
               </p:txBody>

</xml_diff>

<commit_message>
Pre-Champs Updates (LMR to FMB)
</commit_message>
<xml_diff>
--- a/alliances/alliance_interface.pptx
+++ b/alliances/alliance_interface.pptx
@@ -247,7 +247,7 @@
           <a:p>
             <a:fld id="{B0EC7D9C-C39F-4904-9B8C-0ED70A370381}" type="datetimeFigureOut">
               <a:rPr lang="en-US" smtClean="0"/>
-              <a:t>3/28/2017</a:t>
+              <a:t>4/17/2017</a:t>
             </a:fld>
             <a:endParaRPr lang="en-US"/>
           </a:p>
@@ -415,7 +415,7 @@
           <a:p>
             <a:fld id="{B0EC7D9C-C39F-4904-9B8C-0ED70A370381}" type="datetimeFigureOut">
               <a:rPr lang="en-US" smtClean="0"/>
-              <a:t>3/28/2017</a:t>
+              <a:t>4/17/2017</a:t>
             </a:fld>
             <a:endParaRPr lang="en-US"/>
           </a:p>
@@ -593,7 +593,7 @@
           <a:p>
             <a:fld id="{B0EC7D9C-C39F-4904-9B8C-0ED70A370381}" type="datetimeFigureOut">
               <a:rPr lang="en-US" smtClean="0"/>
-              <a:t>3/28/2017</a:t>
+              <a:t>4/17/2017</a:t>
             </a:fld>
             <a:endParaRPr lang="en-US"/>
           </a:p>
@@ -761,7 +761,7 @@
           <a:p>
             <a:fld id="{B0EC7D9C-C39F-4904-9B8C-0ED70A370381}" type="datetimeFigureOut">
               <a:rPr lang="en-US" smtClean="0"/>
-              <a:t>3/28/2017</a:t>
+              <a:t>4/17/2017</a:t>
             </a:fld>
             <a:endParaRPr lang="en-US"/>
           </a:p>
@@ -1006,7 +1006,7 @@
           <a:p>
             <a:fld id="{B0EC7D9C-C39F-4904-9B8C-0ED70A370381}" type="datetimeFigureOut">
               <a:rPr lang="en-US" smtClean="0"/>
-              <a:t>3/28/2017</a:t>
+              <a:t>4/17/2017</a:t>
             </a:fld>
             <a:endParaRPr lang="en-US"/>
           </a:p>
@@ -1235,7 +1235,7 @@
           <a:p>
             <a:fld id="{B0EC7D9C-C39F-4904-9B8C-0ED70A370381}" type="datetimeFigureOut">
               <a:rPr lang="en-US" smtClean="0"/>
-              <a:t>3/28/2017</a:t>
+              <a:t>4/17/2017</a:t>
             </a:fld>
             <a:endParaRPr lang="en-US"/>
           </a:p>
@@ -1599,7 +1599,7 @@
           <a:p>
             <a:fld id="{B0EC7D9C-C39F-4904-9B8C-0ED70A370381}" type="datetimeFigureOut">
               <a:rPr lang="en-US" smtClean="0"/>
-              <a:t>3/28/2017</a:t>
+              <a:t>4/17/2017</a:t>
             </a:fld>
             <a:endParaRPr lang="en-US"/>
           </a:p>
@@ -1716,7 +1716,7 @@
           <a:p>
             <a:fld id="{B0EC7D9C-C39F-4904-9B8C-0ED70A370381}" type="datetimeFigureOut">
               <a:rPr lang="en-US" smtClean="0"/>
-              <a:t>3/28/2017</a:t>
+              <a:t>4/17/2017</a:t>
             </a:fld>
             <a:endParaRPr lang="en-US"/>
           </a:p>
@@ -1811,7 +1811,7 @@
           <a:p>
             <a:fld id="{B0EC7D9C-C39F-4904-9B8C-0ED70A370381}" type="datetimeFigureOut">
               <a:rPr lang="en-US" smtClean="0"/>
-              <a:t>3/28/2017</a:t>
+              <a:t>4/17/2017</a:t>
             </a:fld>
             <a:endParaRPr lang="en-US"/>
           </a:p>
@@ -2086,7 +2086,7 @@
           <a:p>
             <a:fld id="{B0EC7D9C-C39F-4904-9B8C-0ED70A370381}" type="datetimeFigureOut">
               <a:rPr lang="en-US" smtClean="0"/>
-              <a:t>3/28/2017</a:t>
+              <a:t>4/17/2017</a:t>
             </a:fld>
             <a:endParaRPr lang="en-US"/>
           </a:p>
@@ -2338,7 +2338,7 @@
           <a:p>
             <a:fld id="{B0EC7D9C-C39F-4904-9B8C-0ED70A370381}" type="datetimeFigureOut">
               <a:rPr lang="en-US" smtClean="0"/>
-              <a:t>3/28/2017</a:t>
+              <a:t>4/17/2017</a:t>
             </a:fld>
             <a:endParaRPr lang="en-US"/>
           </a:p>
@@ -2549,7 +2549,7 @@
           <a:p>
             <a:fld id="{B0EC7D9C-C39F-4904-9B8C-0ED70A370381}" type="datetimeFigureOut">
               <a:rPr lang="en-US" smtClean="0"/>
-              <a:t>3/28/2017</a:t>
+              <a:t>4/17/2017</a:t>
             </a:fld>
             <a:endParaRPr lang="en-US"/>
           </a:p>
@@ -6791,7 +6791,7 @@
                         <a:schemeClr val="tx1"/>
                       </a:solidFill>
                     </a:rPr>
-                    <a:t>Gears Scored LMR: tot_auto_gears_scored_left_1/tot_auto_gears_scored_mid_1/tot_auto_gears_scored_right_1</a:t>
+                    <a:t>Gears Scored FMB: tot_auto_gears_scored_fdr_1/tot_auto_gears_scored_mid_1/tot_auto_gears_scored_boi_1</a:t>
                   </a:r>
                 </a:p>
                 <a:p>
@@ -7610,7 +7610,7 @@
                         <a:schemeClr val="tx1"/>
                       </a:solidFill>
                     </a:rPr>
-                    <a:t>Gears Scored LMR: tot_auto_gears_scored_left_2/tot_auto_gears_scored_mid_2/tot_auto_gears_scored_right_2</a:t>
+                    <a:t>Gears Scored FMB: tot_auto_gears_scored_fdr_2/tot_auto_gears_scored_mid_2/tot_auto_gears_scored_boi_2</a:t>
                   </a:r>
                 </a:p>
                 <a:p>
@@ -7899,7 +7899,7 @@
                         <a:schemeClr val="tx1"/>
                       </a:solidFill>
                     </a:rPr>
-                    <a:t>Gears Scored LMR: tot_auto_gears_scored_left_3/tot_auto_gears_scored_mid_3/tot_auto_gears_scored_right_3</a:t>
+                    <a:t>Gears Scored FMB: tot_auto_gears_scored_fdr_3/tot_auto_gears_scored_mid_3/tot_auto_gears_scored_boi_3</a:t>
                   </a:r>
                 </a:p>
                 <a:p>
@@ -8188,7 +8188,7 @@
                         <a:schemeClr val="tx1"/>
                       </a:solidFill>
                     </a:rPr>
-                    <a:t>Gears Scored LMR: tot_auto_gears_scored_left_4/tot_auto_gears_scored_mid_4/tot_auto_gears_scored_right_4</a:t>
+                    <a:t>Gears Scored FMB: tot_auto_gears_scored_fdr_4/tot_auto_gears_scored_mid_4/tot_auto_gears_scored_boi_4</a:t>
                   </a:r>
                 </a:p>
                 <a:p>
@@ -9012,7 +9012,7 @@
                         <a:schemeClr val="tx1"/>
                       </a:solidFill>
                     </a:rPr>
-                    <a:t>Gears Scored LMR: tot_auto_gears_scored_left_5/tot_auto_gears_scored_mid_5/tot_auto_gears_scored_right_5</a:t>
+                    <a:t>Gears Scored FMB: tot_auto_gears_scored_fdr_5/tot_auto_gears_scored_mid_5/tot_auto_gears_scored_boi_5</a:t>
                   </a:r>
                 </a:p>
                 <a:p>
@@ -9301,7 +9301,7 @@
                         <a:schemeClr val="tx1"/>
                       </a:solidFill>
                     </a:rPr>
-                    <a:t>Gears Scored LMR: tot_auto_gears_scored_left_6/tot_auto_gears_scored_mid_6/tot_auto_gears_scored_right_6</a:t>
+                    <a:t>Gears Scored FMB: tot_auto_gears_scored_fdr_6/tot_auto_gears_scored_mid_6/tot_auto_gears_scored_boi_6</a:t>
                   </a:r>
                 </a:p>
                 <a:p>

</xml_diff>